<commit_message>
Paper changes, new graph layout, maybe fixed benchmark slowdown
</commit_message>
<xml_diff>
--- a/Paper/Figures/jacobi.pptx
+++ b/Paper/Figures/jacobi.pptx
@@ -11039,7 +11039,7 @@
         </p:nvSpPr>
         <p:spPr>
           <a:xfrm>
-            <a:off x="458644" y="295038"/>
+            <a:off x="189703" y="578920"/>
             <a:ext cx="9240218" cy="1446550"/>
           </a:xfrm>
           <a:prstGeom prst="rect">
@@ -11283,7 +11283,7 @@
           </a:p>
           <a:p>
             <a:r>
-              <a:rPr lang="en-US" sz="1100" smtClean="0">
+              <a:rPr lang="en-US" sz="1100" dirty="0" smtClean="0">
                 <a:latin typeface="Courier"/>
                 <a:cs typeface="Courier"/>
               </a:rPr>

</xml_diff>

<commit_message>
state of repo after JPC submission
</commit_message>
<xml_diff>
--- a/Paper/Figures/jacobi.pptx
+++ b/Paper/Figures/jacobi.pptx
@@ -357,11 +357,11 @@
           <c:showBubbleSize val="0"/>
         </c:dLbls>
         <c:gapWidth val="150"/>
-        <c:axId val="2071696904"/>
-        <c:axId val="2071702376"/>
+        <c:axId val="2046112072"/>
+        <c:axId val="2046117496"/>
       </c:barChart>
       <c:catAx>
-        <c:axId val="2071696904"/>
+        <c:axId val="2046112072"/>
         <c:scaling>
           <c:orientation val="minMax"/>
         </c:scaling>
@@ -389,7 +389,7 @@
         <c:majorTickMark val="out"/>
         <c:minorTickMark val="none"/>
         <c:tickLblPos val="nextTo"/>
-        <c:crossAx val="2071702376"/>
+        <c:crossAx val="2046117496"/>
         <c:crosses val="autoZero"/>
         <c:auto val="1"/>
         <c:lblAlgn val="ctr"/>
@@ -397,7 +397,7 @@
         <c:noMultiLvlLbl val="0"/>
       </c:catAx>
       <c:valAx>
-        <c:axId val="2071702376"/>
+        <c:axId val="2046117496"/>
         <c:scaling>
           <c:orientation val="minMax"/>
         </c:scaling>
@@ -432,7 +432,7 @@
         <c:majorTickMark val="out"/>
         <c:minorTickMark val="none"/>
         <c:tickLblPos val="nextTo"/>
-        <c:crossAx val="2071696904"/>
+        <c:crossAx val="2046112072"/>
         <c:crosses val="autoZero"/>
         <c:crossBetween val="between"/>
       </c:valAx>
@@ -676,11 +676,11 @@
           <c:showBubbleSize val="0"/>
         </c:dLbls>
         <c:gapWidth val="150"/>
-        <c:axId val="2071778712"/>
-        <c:axId val="2071784184"/>
+        <c:axId val="2045993528"/>
+        <c:axId val="2045999000"/>
       </c:barChart>
       <c:catAx>
-        <c:axId val="2071778712"/>
+        <c:axId val="2045993528"/>
         <c:scaling>
           <c:orientation val="minMax"/>
         </c:scaling>
@@ -708,7 +708,7 @@
         <c:majorTickMark val="out"/>
         <c:minorTickMark val="none"/>
         <c:tickLblPos val="nextTo"/>
-        <c:crossAx val="2071784184"/>
+        <c:crossAx val="2045999000"/>
         <c:crosses val="autoZero"/>
         <c:auto val="1"/>
         <c:lblAlgn val="ctr"/>
@@ -716,7 +716,7 @@
         <c:noMultiLvlLbl val="0"/>
       </c:catAx>
       <c:valAx>
-        <c:axId val="2071784184"/>
+        <c:axId val="2045999000"/>
         <c:scaling>
           <c:orientation val="minMax"/>
         </c:scaling>
@@ -746,7 +746,7 @@
         <c:majorTickMark val="out"/>
         <c:minorTickMark val="none"/>
         <c:tickLblPos val="nextTo"/>
-        <c:crossAx val="2071778712"/>
+        <c:crossAx val="2045993528"/>
         <c:crosses val="autoZero"/>
         <c:crossBetween val="between"/>
       </c:valAx>
@@ -882,11 +882,11 @@
           <c:showBubbleSize val="0"/>
         </c:dLbls>
         <c:gapWidth val="150"/>
-        <c:axId val="2071817496"/>
-        <c:axId val="2071822968"/>
+        <c:axId val="2046078504"/>
+        <c:axId val="2046083976"/>
       </c:barChart>
       <c:catAx>
-        <c:axId val="2071817496"/>
+        <c:axId val="2046078504"/>
         <c:scaling>
           <c:orientation val="minMax"/>
         </c:scaling>
@@ -914,7 +914,7 @@
         <c:majorTickMark val="out"/>
         <c:minorTickMark val="none"/>
         <c:tickLblPos val="nextTo"/>
-        <c:crossAx val="2071822968"/>
+        <c:crossAx val="2046083976"/>
         <c:crosses val="autoZero"/>
         <c:auto val="1"/>
         <c:lblAlgn val="ctr"/>
@@ -922,7 +922,7 @@
         <c:noMultiLvlLbl val="0"/>
       </c:catAx>
       <c:valAx>
-        <c:axId val="2071822968"/>
+        <c:axId val="2046083976"/>
         <c:scaling>
           <c:orientation val="minMax"/>
         </c:scaling>
@@ -952,7 +952,7 @@
         <c:majorTickMark val="out"/>
         <c:minorTickMark val="none"/>
         <c:tickLblPos val="nextTo"/>
-        <c:crossAx val="2071817496"/>
+        <c:crossAx val="2046078504"/>
         <c:crosses val="autoZero"/>
         <c:crossBetween val="between"/>
       </c:valAx>
@@ -1088,11 +1088,11 @@
           <c:showBubbleSize val="0"/>
         </c:dLbls>
         <c:gapWidth val="150"/>
-        <c:axId val="2071856616"/>
-        <c:axId val="2071862088"/>
+        <c:axId val="2098158952"/>
+        <c:axId val="2098164424"/>
       </c:barChart>
       <c:catAx>
-        <c:axId val="2071856616"/>
+        <c:axId val="2098158952"/>
         <c:scaling>
           <c:orientation val="minMax"/>
         </c:scaling>
@@ -1120,7 +1120,7 @@
         <c:majorTickMark val="out"/>
         <c:minorTickMark val="none"/>
         <c:tickLblPos val="nextTo"/>
-        <c:crossAx val="2071862088"/>
+        <c:crossAx val="2098164424"/>
         <c:crosses val="autoZero"/>
         <c:auto val="1"/>
         <c:lblAlgn val="ctr"/>
@@ -1128,7 +1128,7 @@
         <c:noMultiLvlLbl val="0"/>
       </c:catAx>
       <c:valAx>
-        <c:axId val="2071862088"/>
+        <c:axId val="2098164424"/>
         <c:scaling>
           <c:orientation val="minMax"/>
         </c:scaling>
@@ -1163,7 +1163,7 @@
         <c:majorTickMark val="out"/>
         <c:minorTickMark val="none"/>
         <c:tickLblPos val="nextTo"/>
-        <c:crossAx val="2071856616"/>
+        <c:crossAx val="2098158952"/>
         <c:crosses val="autoZero"/>
         <c:crossBetween val="between"/>
       </c:valAx>
@@ -7083,42 +7083,6 @@
           </a:p>
         </p:txBody>
       </p:sp>
-      <p:sp>
-        <p:nvSpPr>
-          <p:cNvPr id="16" name="TextBox 15"/>
-          <p:cNvSpPr txBox="1"/>
-          <p:nvPr/>
-        </p:nvSpPr>
-        <p:spPr>
-          <a:xfrm>
-            <a:off x="5725483" y="2299108"/>
-            <a:ext cx="4145823" cy="276999"/>
-          </a:xfrm>
-          <a:prstGeom prst="rect">
-            <a:avLst/>
-          </a:prstGeom>
-          <a:noFill/>
-        </p:spPr>
-        <p:txBody>
-          <a:bodyPr wrap="square" rtlCol="0">
-            <a:spAutoFit/>
-          </a:bodyPr>
-          <a:lstStyle/>
-          <a:p>
-            <a:r>
-              <a:rPr lang="en-US" sz="1200" b="1" u="sng" dirty="0" smtClean="0">
-                <a:latin typeface="Times New Roman"/>
-                <a:cs typeface="Times New Roman"/>
-              </a:rPr>
-              <a:t>Normalized Message Count Curves (left y-axis)</a:t>
-            </a:r>
-            <a:endParaRPr lang="en-US" sz="1200" b="1" u="sng" dirty="0">
-              <a:latin typeface="Times New Roman"/>
-              <a:cs typeface="Times New Roman"/>
-            </a:endParaRPr>
-          </a:p>
-        </p:txBody>
-      </p:sp>
       <p:pic>
         <p:nvPicPr>
           <p:cNvPr id="3" name="Picture 2" descr="fdtd2d.pdf"/>
@@ -7149,6 +7113,63 @@
           </a:prstGeom>
         </p:spPr>
       </p:pic>
+      <p:sp>
+        <p:nvSpPr>
+          <p:cNvPr id="9" name="TextBox 8"/>
+          <p:cNvSpPr txBox="1"/>
+          <p:nvPr/>
+        </p:nvSpPr>
+        <p:spPr>
+          <a:xfrm>
+            <a:off x="5945536" y="2323531"/>
+            <a:ext cx="4145823" cy="276999"/>
+          </a:xfrm>
+          <a:prstGeom prst="rect">
+            <a:avLst/>
+          </a:prstGeom>
+          <a:noFill/>
+        </p:spPr>
+        <p:txBody>
+          <a:bodyPr wrap="square" rtlCol="0">
+            <a:spAutoFit/>
+          </a:bodyPr>
+          <a:lstStyle/>
+          <a:p>
+            <a:r>
+              <a:rPr lang="en-US" sz="1200" b="1" u="sng" dirty="0" smtClean="0">
+                <a:latin typeface="Times New Roman"/>
+                <a:cs typeface="Times New Roman"/>
+              </a:rPr>
+              <a:t>Curves Showing # of Elements (</a:t>
+            </a:r>
+            <a:r>
+              <a:rPr lang="en-US" sz="1200" b="1" u="sng" dirty="0" smtClean="0">
+                <a:latin typeface="Times New Roman"/>
+                <a:cs typeface="Times New Roman"/>
+              </a:rPr>
+              <a:t>righ</a:t>
+            </a:r>
+            <a:r>
+              <a:rPr lang="en-US" sz="1200" b="1" u="sng" dirty="0" smtClean="0">
+                <a:latin typeface="Times New Roman"/>
+                <a:cs typeface="Times New Roman"/>
+              </a:rPr>
+              <a:t>t </a:t>
+            </a:r>
+            <a:r>
+              <a:rPr lang="en-US" sz="1200" b="1" u="sng" dirty="0" smtClean="0">
+                <a:latin typeface="Times New Roman"/>
+                <a:cs typeface="Times New Roman"/>
+              </a:rPr>
+              <a:t>y-axis)</a:t>
+            </a:r>
+            <a:endParaRPr lang="en-US" sz="1200" b="1" u="sng" dirty="0">
+              <a:latin typeface="Times New Roman"/>
+              <a:cs typeface="Times New Roman"/>
+            </a:endParaRPr>
+          </a:p>
+        </p:txBody>
+      </p:sp>
     </p:spTree>
     <p:extLst>
       <p:ext uri="{BB962C8B-B14F-4D97-AF65-F5344CB8AC3E}">
@@ -7323,42 +7344,6 @@
           </a:p>
         </p:txBody>
       </p:sp>
-      <p:sp>
-        <p:nvSpPr>
-          <p:cNvPr id="16" name="TextBox 15"/>
-          <p:cNvSpPr txBox="1"/>
-          <p:nvPr/>
-        </p:nvSpPr>
-        <p:spPr>
-          <a:xfrm>
-            <a:off x="5725483" y="2299108"/>
-            <a:ext cx="4145823" cy="276999"/>
-          </a:xfrm>
-          <a:prstGeom prst="rect">
-            <a:avLst/>
-          </a:prstGeom>
-          <a:noFill/>
-        </p:spPr>
-        <p:txBody>
-          <a:bodyPr wrap="square" rtlCol="0">
-            <a:spAutoFit/>
-          </a:bodyPr>
-          <a:lstStyle/>
-          <a:p>
-            <a:r>
-              <a:rPr lang="en-US" sz="1200" b="1" u="sng" dirty="0" smtClean="0">
-                <a:latin typeface="Times New Roman"/>
-                <a:cs typeface="Times New Roman"/>
-              </a:rPr>
-              <a:t>Normalized Message Count Curves (left y-axis)</a:t>
-            </a:r>
-            <a:endParaRPr lang="en-US" sz="1200" b="1" u="sng" dirty="0">
-              <a:latin typeface="Times New Roman"/>
-              <a:cs typeface="Times New Roman"/>
-            </a:endParaRPr>
-          </a:p>
-        </p:txBody>
-      </p:sp>
       <p:pic>
         <p:nvPicPr>
           <p:cNvPr id="3" name="Picture 2" descr="jacobi-2d.pdf"/>
@@ -7389,6 +7374,63 @@
           </a:prstGeom>
         </p:spPr>
       </p:pic>
+      <p:sp>
+        <p:nvSpPr>
+          <p:cNvPr id="9" name="TextBox 8"/>
+          <p:cNvSpPr txBox="1"/>
+          <p:nvPr/>
+        </p:nvSpPr>
+        <p:spPr>
+          <a:xfrm>
+            <a:off x="5945536" y="2323531"/>
+            <a:ext cx="4145823" cy="276999"/>
+          </a:xfrm>
+          <a:prstGeom prst="rect">
+            <a:avLst/>
+          </a:prstGeom>
+          <a:noFill/>
+        </p:spPr>
+        <p:txBody>
+          <a:bodyPr wrap="square" rtlCol="0">
+            <a:spAutoFit/>
+          </a:bodyPr>
+          <a:lstStyle/>
+          <a:p>
+            <a:r>
+              <a:rPr lang="en-US" sz="1200" b="1" u="sng" dirty="0" smtClean="0">
+                <a:latin typeface="Times New Roman"/>
+                <a:cs typeface="Times New Roman"/>
+              </a:rPr>
+              <a:t>Curves Showing # of Elements (</a:t>
+            </a:r>
+            <a:r>
+              <a:rPr lang="en-US" sz="1200" b="1" u="sng" dirty="0" smtClean="0">
+                <a:latin typeface="Times New Roman"/>
+                <a:cs typeface="Times New Roman"/>
+              </a:rPr>
+              <a:t>righ</a:t>
+            </a:r>
+            <a:r>
+              <a:rPr lang="en-US" sz="1200" b="1" u="sng" dirty="0" smtClean="0">
+                <a:latin typeface="Times New Roman"/>
+                <a:cs typeface="Times New Roman"/>
+              </a:rPr>
+              <a:t>t </a:t>
+            </a:r>
+            <a:r>
+              <a:rPr lang="en-US" sz="1200" b="1" u="sng" dirty="0" smtClean="0">
+                <a:latin typeface="Times New Roman"/>
+                <a:cs typeface="Times New Roman"/>
+              </a:rPr>
+              <a:t>y-axis)</a:t>
+            </a:r>
+            <a:endParaRPr lang="en-US" sz="1200" b="1" u="sng" dirty="0">
+              <a:latin typeface="Times New Roman"/>
+              <a:cs typeface="Times New Roman"/>
+            </a:endParaRPr>
+          </a:p>
+        </p:txBody>
+      </p:sp>
     </p:spTree>
     <p:extLst>
       <p:ext uri="{BB962C8B-B14F-4D97-AF65-F5344CB8AC3E}">
@@ -7563,42 +7605,6 @@
           </a:p>
         </p:txBody>
       </p:sp>
-      <p:sp>
-        <p:nvSpPr>
-          <p:cNvPr id="16" name="TextBox 15"/>
-          <p:cNvSpPr txBox="1"/>
-          <p:nvPr/>
-        </p:nvSpPr>
-        <p:spPr>
-          <a:xfrm>
-            <a:off x="5725483" y="2299108"/>
-            <a:ext cx="4145823" cy="276999"/>
-          </a:xfrm>
-          <a:prstGeom prst="rect">
-            <a:avLst/>
-          </a:prstGeom>
-          <a:noFill/>
-        </p:spPr>
-        <p:txBody>
-          <a:bodyPr wrap="square" rtlCol="0">
-            <a:spAutoFit/>
-          </a:bodyPr>
-          <a:lstStyle/>
-          <a:p>
-            <a:r>
-              <a:rPr lang="en-US" sz="1200" b="1" u="sng" dirty="0" smtClean="0">
-                <a:latin typeface="Times New Roman"/>
-                <a:cs typeface="Times New Roman"/>
-              </a:rPr>
-              <a:t>Normalized Message Count Curves (left y-axis)</a:t>
-            </a:r>
-            <a:endParaRPr lang="en-US" sz="1200" b="1" u="sng" dirty="0">
-              <a:latin typeface="Times New Roman"/>
-              <a:cs typeface="Times New Roman"/>
-            </a:endParaRPr>
-          </a:p>
-        </p:txBody>
-      </p:sp>
       <p:pic>
         <p:nvPicPr>
           <p:cNvPr id="2" name="Picture 1" descr="folding.pdf"/>
@@ -7621,7 +7627,7 @@
         </p:blipFill>
         <p:spPr>
           <a:xfrm>
-            <a:off x="40316" y="974502"/>
+            <a:off x="-24812" y="974502"/>
             <a:ext cx="5294829" cy="3717646"/>
           </a:xfrm>
           <a:prstGeom prst="rect">
@@ -7629,6 +7635,63 @@
           </a:prstGeom>
         </p:spPr>
       </p:pic>
+      <p:sp>
+        <p:nvSpPr>
+          <p:cNvPr id="9" name="TextBox 8"/>
+          <p:cNvSpPr txBox="1"/>
+          <p:nvPr/>
+        </p:nvSpPr>
+        <p:spPr>
+          <a:xfrm>
+            <a:off x="5945536" y="2315390"/>
+            <a:ext cx="4145823" cy="276999"/>
+          </a:xfrm>
+          <a:prstGeom prst="rect">
+            <a:avLst/>
+          </a:prstGeom>
+          <a:noFill/>
+        </p:spPr>
+        <p:txBody>
+          <a:bodyPr wrap="square" rtlCol="0">
+            <a:spAutoFit/>
+          </a:bodyPr>
+          <a:lstStyle/>
+          <a:p>
+            <a:r>
+              <a:rPr lang="en-US" sz="1200" b="1" u="sng" dirty="0" smtClean="0">
+                <a:latin typeface="Times New Roman"/>
+                <a:cs typeface="Times New Roman"/>
+              </a:rPr>
+              <a:t>Curves Showing # of Elements (</a:t>
+            </a:r>
+            <a:r>
+              <a:rPr lang="en-US" sz="1200" b="1" u="sng" dirty="0" smtClean="0">
+                <a:latin typeface="Times New Roman"/>
+                <a:cs typeface="Times New Roman"/>
+              </a:rPr>
+              <a:t>righ</a:t>
+            </a:r>
+            <a:r>
+              <a:rPr lang="en-US" sz="1200" b="1" u="sng" dirty="0" smtClean="0">
+                <a:latin typeface="Times New Roman"/>
+                <a:cs typeface="Times New Roman"/>
+              </a:rPr>
+              <a:t>t </a:t>
+            </a:r>
+            <a:r>
+              <a:rPr lang="en-US" sz="1200" b="1" u="sng" dirty="0" smtClean="0">
+                <a:latin typeface="Times New Roman"/>
+                <a:cs typeface="Times New Roman"/>
+              </a:rPr>
+              <a:t>y-axis)</a:t>
+            </a:r>
+            <a:endParaRPr lang="en-US" sz="1200" b="1" u="sng" dirty="0">
+              <a:latin typeface="Times New Roman"/>
+              <a:cs typeface="Times New Roman"/>
+            </a:endParaRPr>
+          </a:p>
+        </p:txBody>
+      </p:sp>
     </p:spTree>
     <p:extLst>
       <p:ext uri="{BB962C8B-B14F-4D97-AF65-F5344CB8AC3E}">
@@ -7752,42 +7815,6 @@
         <p:spPr>
           <a:xfrm>
             <a:off x="5725483" y="1910993"/>
-            <a:ext cx="4145823" cy="276999"/>
-          </a:xfrm>
-          <a:prstGeom prst="rect">
-            <a:avLst/>
-          </a:prstGeom>
-          <a:noFill/>
-        </p:spPr>
-        <p:txBody>
-          <a:bodyPr wrap="square" rtlCol="0">
-            <a:spAutoFit/>
-          </a:bodyPr>
-          <a:lstStyle/>
-          <a:p>
-            <a:r>
-              <a:rPr lang="en-US" sz="1200" b="1" u="sng" dirty="0" smtClean="0">
-                <a:latin typeface="Times New Roman"/>
-                <a:cs typeface="Times New Roman"/>
-              </a:rPr>
-              <a:t>Normalized Message Count Curves (left y-axis)</a:t>
-            </a:r>
-            <a:endParaRPr lang="en-US" sz="1200" b="1" u="sng" dirty="0">
-              <a:latin typeface="Times New Roman"/>
-              <a:cs typeface="Times New Roman"/>
-            </a:endParaRPr>
-          </a:p>
-        </p:txBody>
-      </p:sp>
-      <p:sp>
-        <p:nvSpPr>
-          <p:cNvPr id="16" name="TextBox 15"/>
-          <p:cNvSpPr txBox="1"/>
-          <p:nvPr/>
-        </p:nvSpPr>
-        <p:spPr>
-          <a:xfrm>
-            <a:off x="5725483" y="2780454"/>
             <a:ext cx="4145823" cy="276999"/>
           </a:xfrm>
           <a:prstGeom prst="rect">
@@ -7941,6 +7968,63 @@
           </a:prstGeom>
         </p:spPr>
       </p:pic>
+      <p:sp>
+        <p:nvSpPr>
+          <p:cNvPr id="13" name="TextBox 12"/>
+          <p:cNvSpPr txBox="1"/>
+          <p:nvPr/>
+        </p:nvSpPr>
+        <p:spPr>
+          <a:xfrm>
+            <a:off x="5945536" y="2822150"/>
+            <a:ext cx="4145823" cy="276999"/>
+          </a:xfrm>
+          <a:prstGeom prst="rect">
+            <a:avLst/>
+          </a:prstGeom>
+          <a:noFill/>
+        </p:spPr>
+        <p:txBody>
+          <a:bodyPr wrap="square" rtlCol="0">
+            <a:spAutoFit/>
+          </a:bodyPr>
+          <a:lstStyle/>
+          <a:p>
+            <a:r>
+              <a:rPr lang="en-US" sz="1200" b="1" u="sng" dirty="0" smtClean="0">
+                <a:latin typeface="Times New Roman"/>
+                <a:cs typeface="Times New Roman"/>
+              </a:rPr>
+              <a:t>Curves Showing # of Elements (</a:t>
+            </a:r>
+            <a:r>
+              <a:rPr lang="en-US" sz="1200" b="1" u="sng" dirty="0" smtClean="0">
+                <a:latin typeface="Times New Roman"/>
+                <a:cs typeface="Times New Roman"/>
+              </a:rPr>
+              <a:t>righ</a:t>
+            </a:r>
+            <a:r>
+              <a:rPr lang="en-US" sz="1200" b="1" u="sng" dirty="0" smtClean="0">
+                <a:latin typeface="Times New Roman"/>
+                <a:cs typeface="Times New Roman"/>
+              </a:rPr>
+              <a:t>t </a:t>
+            </a:r>
+            <a:r>
+              <a:rPr lang="en-US" sz="1200" b="1" u="sng" dirty="0" smtClean="0">
+                <a:latin typeface="Times New Roman"/>
+                <a:cs typeface="Times New Roman"/>
+              </a:rPr>
+              <a:t>y-axis)</a:t>
+            </a:r>
+            <a:endParaRPr lang="en-US" sz="1200" b="1" u="sng" dirty="0">
+              <a:latin typeface="Times New Roman"/>
+              <a:cs typeface="Times New Roman"/>
+            </a:endParaRPr>
+          </a:p>
+        </p:txBody>
+      </p:sp>
     </p:spTree>
     <p:extLst>
       <p:ext uri="{BB962C8B-B14F-4D97-AF65-F5344CB8AC3E}">
@@ -8115,42 +8199,6 @@
           </a:p>
         </p:txBody>
       </p:sp>
-      <p:sp>
-        <p:nvSpPr>
-          <p:cNvPr id="16" name="TextBox 15"/>
-          <p:cNvSpPr txBox="1"/>
-          <p:nvPr/>
-        </p:nvSpPr>
-        <p:spPr>
-          <a:xfrm>
-            <a:off x="5725483" y="2299108"/>
-            <a:ext cx="4145823" cy="276999"/>
-          </a:xfrm>
-          <a:prstGeom prst="rect">
-            <a:avLst/>
-          </a:prstGeom>
-          <a:noFill/>
-        </p:spPr>
-        <p:txBody>
-          <a:bodyPr wrap="square" rtlCol="0">
-            <a:spAutoFit/>
-          </a:bodyPr>
-          <a:lstStyle/>
-          <a:p>
-            <a:r>
-              <a:rPr lang="en-US" sz="1200" b="1" u="sng" dirty="0" smtClean="0">
-                <a:latin typeface="Times New Roman"/>
-                <a:cs typeface="Times New Roman"/>
-              </a:rPr>
-              <a:t>Normalized Message Count Curves (left y-axis)</a:t>
-            </a:r>
-            <a:endParaRPr lang="en-US" sz="1200" b="1" u="sng" dirty="0">
-              <a:latin typeface="Times New Roman"/>
-              <a:cs typeface="Times New Roman"/>
-            </a:endParaRPr>
-          </a:p>
-        </p:txBody>
-      </p:sp>
       <p:pic>
         <p:nvPicPr>
           <p:cNvPr id="3" name="Picture 2" descr="fdtd2d.pdf"/>
@@ -8181,6 +8229,63 @@
           </a:prstGeom>
         </p:spPr>
       </p:pic>
+      <p:sp>
+        <p:nvSpPr>
+          <p:cNvPr id="9" name="TextBox 8"/>
+          <p:cNvSpPr txBox="1"/>
+          <p:nvPr/>
+        </p:nvSpPr>
+        <p:spPr>
+          <a:xfrm>
+            <a:off x="5945536" y="2323531"/>
+            <a:ext cx="4145823" cy="276999"/>
+          </a:xfrm>
+          <a:prstGeom prst="rect">
+            <a:avLst/>
+          </a:prstGeom>
+          <a:noFill/>
+        </p:spPr>
+        <p:txBody>
+          <a:bodyPr wrap="square" rtlCol="0">
+            <a:spAutoFit/>
+          </a:bodyPr>
+          <a:lstStyle/>
+          <a:p>
+            <a:r>
+              <a:rPr lang="en-US" sz="1200" b="1" u="sng" dirty="0" smtClean="0">
+                <a:latin typeface="Times New Roman"/>
+                <a:cs typeface="Times New Roman"/>
+              </a:rPr>
+              <a:t>Curves Showing # of Elements (</a:t>
+            </a:r>
+            <a:r>
+              <a:rPr lang="en-US" sz="1200" b="1" u="sng" dirty="0" smtClean="0">
+                <a:latin typeface="Times New Roman"/>
+                <a:cs typeface="Times New Roman"/>
+              </a:rPr>
+              <a:t>righ</a:t>
+            </a:r>
+            <a:r>
+              <a:rPr lang="en-US" sz="1200" b="1" u="sng" dirty="0" smtClean="0">
+                <a:latin typeface="Times New Roman"/>
+                <a:cs typeface="Times New Roman"/>
+              </a:rPr>
+              <a:t>t </a:t>
+            </a:r>
+            <a:r>
+              <a:rPr lang="en-US" sz="1200" b="1" u="sng" dirty="0" smtClean="0">
+                <a:latin typeface="Times New Roman"/>
+                <a:cs typeface="Times New Roman"/>
+              </a:rPr>
+              <a:t>y-axis)</a:t>
+            </a:r>
+            <a:endParaRPr lang="en-US" sz="1200" b="1" u="sng" dirty="0">
+              <a:latin typeface="Times New Roman"/>
+              <a:cs typeface="Times New Roman"/>
+            </a:endParaRPr>
+          </a:p>
+        </p:txBody>
+      </p:sp>
     </p:spTree>
     <p:extLst>
       <p:ext uri="{BB962C8B-B14F-4D97-AF65-F5344CB8AC3E}">
@@ -9076,42 +9181,6 @@
           </a:p>
         </p:txBody>
       </p:sp>
-      <p:sp>
-        <p:nvSpPr>
-          <p:cNvPr id="16" name="TextBox 15"/>
-          <p:cNvSpPr txBox="1"/>
-          <p:nvPr/>
-        </p:nvSpPr>
-        <p:spPr>
-          <a:xfrm>
-            <a:off x="5725483" y="2299108"/>
-            <a:ext cx="4145823" cy="276999"/>
-          </a:xfrm>
-          <a:prstGeom prst="rect">
-            <a:avLst/>
-          </a:prstGeom>
-          <a:noFill/>
-        </p:spPr>
-        <p:txBody>
-          <a:bodyPr wrap="square" rtlCol="0">
-            <a:spAutoFit/>
-          </a:bodyPr>
-          <a:lstStyle/>
-          <a:p>
-            <a:r>
-              <a:rPr lang="en-US" sz="1200" b="1" u="sng" dirty="0" smtClean="0">
-                <a:latin typeface="Times New Roman"/>
-                <a:cs typeface="Times New Roman"/>
-              </a:rPr>
-              <a:t>Normalized Message Count Curves (left y-axis)</a:t>
-            </a:r>
-            <a:endParaRPr lang="en-US" sz="1200" b="1" u="sng" dirty="0">
-              <a:latin typeface="Times New Roman"/>
-              <a:cs typeface="Times New Roman"/>
-            </a:endParaRPr>
-          </a:p>
-        </p:txBody>
-      </p:sp>
       <p:pic>
         <p:nvPicPr>
           <p:cNvPr id="2" name="Picture 1" descr="jacobi-2d.pdf"/>
@@ -9142,6 +9211,63 @@
           </a:prstGeom>
         </p:spPr>
       </p:pic>
+      <p:sp>
+        <p:nvSpPr>
+          <p:cNvPr id="9" name="TextBox 8"/>
+          <p:cNvSpPr txBox="1"/>
+          <p:nvPr/>
+        </p:nvSpPr>
+        <p:spPr>
+          <a:xfrm>
+            <a:off x="5945536" y="2335279"/>
+            <a:ext cx="4145823" cy="276999"/>
+          </a:xfrm>
+          <a:prstGeom prst="rect">
+            <a:avLst/>
+          </a:prstGeom>
+          <a:noFill/>
+        </p:spPr>
+        <p:txBody>
+          <a:bodyPr wrap="square" rtlCol="0">
+            <a:spAutoFit/>
+          </a:bodyPr>
+          <a:lstStyle/>
+          <a:p>
+            <a:r>
+              <a:rPr lang="en-US" sz="1200" b="1" u="sng" dirty="0" smtClean="0">
+                <a:latin typeface="Times New Roman"/>
+                <a:cs typeface="Times New Roman"/>
+              </a:rPr>
+              <a:t>Curves Showing # of Elements (</a:t>
+            </a:r>
+            <a:r>
+              <a:rPr lang="en-US" sz="1200" b="1" u="sng" dirty="0" smtClean="0">
+                <a:latin typeface="Times New Roman"/>
+                <a:cs typeface="Times New Roman"/>
+              </a:rPr>
+              <a:t>righ</a:t>
+            </a:r>
+            <a:r>
+              <a:rPr lang="en-US" sz="1200" b="1" u="sng" dirty="0" smtClean="0">
+                <a:latin typeface="Times New Roman"/>
+                <a:cs typeface="Times New Roman"/>
+              </a:rPr>
+              <a:t>t </a:t>
+            </a:r>
+            <a:r>
+              <a:rPr lang="en-US" sz="1200" b="1" u="sng" dirty="0" smtClean="0">
+                <a:latin typeface="Times New Roman"/>
+                <a:cs typeface="Times New Roman"/>
+              </a:rPr>
+              <a:t>y-axis)</a:t>
+            </a:r>
+            <a:endParaRPr lang="en-US" sz="1200" b="1" u="sng" dirty="0">
+              <a:latin typeface="Times New Roman"/>
+              <a:cs typeface="Times New Roman"/>
+            </a:endParaRPr>
+          </a:p>
+        </p:txBody>
+      </p:sp>
     </p:spTree>
     <p:extLst>
       <p:ext uri="{BB962C8B-B14F-4D97-AF65-F5344CB8AC3E}">
@@ -9316,42 +9442,6 @@
           </a:p>
         </p:txBody>
       </p:sp>
-      <p:sp>
-        <p:nvSpPr>
-          <p:cNvPr id="16" name="TextBox 15"/>
-          <p:cNvSpPr txBox="1"/>
-          <p:nvPr/>
-        </p:nvSpPr>
-        <p:spPr>
-          <a:xfrm>
-            <a:off x="5725483" y="2299108"/>
-            <a:ext cx="4145823" cy="276999"/>
-          </a:xfrm>
-          <a:prstGeom prst="rect">
-            <a:avLst/>
-          </a:prstGeom>
-          <a:noFill/>
-        </p:spPr>
-        <p:txBody>
-          <a:bodyPr wrap="square" rtlCol="0">
-            <a:spAutoFit/>
-          </a:bodyPr>
-          <a:lstStyle/>
-          <a:p>
-            <a:r>
-              <a:rPr lang="en-US" sz="1200" b="1" u="sng" dirty="0" smtClean="0">
-                <a:latin typeface="Times New Roman"/>
-                <a:cs typeface="Times New Roman"/>
-              </a:rPr>
-              <a:t>Normalized Message Count Curves (left y-axis)</a:t>
-            </a:r>
-            <a:endParaRPr lang="en-US" sz="1200" b="1" u="sng" dirty="0">
-              <a:latin typeface="Times New Roman"/>
-              <a:cs typeface="Times New Roman"/>
-            </a:endParaRPr>
-          </a:p>
-        </p:txBody>
-      </p:sp>
       <p:pic>
         <p:nvPicPr>
           <p:cNvPr id="3" name="Picture 2" descr="folding.pdf"/>
@@ -9382,6 +9472,63 @@
           </a:prstGeom>
         </p:spPr>
       </p:pic>
+      <p:sp>
+        <p:nvSpPr>
+          <p:cNvPr id="9" name="TextBox 8"/>
+          <p:cNvSpPr txBox="1"/>
+          <p:nvPr/>
+        </p:nvSpPr>
+        <p:spPr>
+          <a:xfrm>
+            <a:off x="5962824" y="2370998"/>
+            <a:ext cx="4145823" cy="276999"/>
+          </a:xfrm>
+          <a:prstGeom prst="rect">
+            <a:avLst/>
+          </a:prstGeom>
+          <a:noFill/>
+        </p:spPr>
+        <p:txBody>
+          <a:bodyPr wrap="square" rtlCol="0">
+            <a:spAutoFit/>
+          </a:bodyPr>
+          <a:lstStyle/>
+          <a:p>
+            <a:r>
+              <a:rPr lang="en-US" sz="1200" b="1" u="sng" dirty="0" smtClean="0">
+                <a:latin typeface="Times New Roman"/>
+                <a:cs typeface="Times New Roman"/>
+              </a:rPr>
+              <a:t>Curves Showing # of Elements (</a:t>
+            </a:r>
+            <a:r>
+              <a:rPr lang="en-US" sz="1200" b="1" u="sng" dirty="0" smtClean="0">
+                <a:latin typeface="Times New Roman"/>
+                <a:cs typeface="Times New Roman"/>
+              </a:rPr>
+              <a:t>righ</a:t>
+            </a:r>
+            <a:r>
+              <a:rPr lang="en-US" sz="1200" b="1" u="sng" dirty="0" smtClean="0">
+                <a:latin typeface="Times New Roman"/>
+                <a:cs typeface="Times New Roman"/>
+              </a:rPr>
+              <a:t>t </a:t>
+            </a:r>
+            <a:r>
+              <a:rPr lang="en-US" sz="1200" b="1" u="sng" dirty="0" smtClean="0">
+                <a:latin typeface="Times New Roman"/>
+                <a:cs typeface="Times New Roman"/>
+              </a:rPr>
+              <a:t>y-axis)</a:t>
+            </a:r>
+            <a:endParaRPr lang="en-US" sz="1200" b="1" u="sng" dirty="0">
+              <a:latin typeface="Times New Roman"/>
+              <a:cs typeface="Times New Roman"/>
+            </a:endParaRPr>
+          </a:p>
+        </p:txBody>
+      </p:sp>
     </p:spTree>
     <p:extLst>
       <p:ext uri="{BB962C8B-B14F-4D97-AF65-F5344CB8AC3E}">
@@ -9505,42 +9652,6 @@
         <p:spPr>
           <a:xfrm>
             <a:off x="5725483" y="1910993"/>
-            <a:ext cx="4145823" cy="276999"/>
-          </a:xfrm>
-          <a:prstGeom prst="rect">
-            <a:avLst/>
-          </a:prstGeom>
-          <a:noFill/>
-        </p:spPr>
-        <p:txBody>
-          <a:bodyPr wrap="square" rtlCol="0">
-            <a:spAutoFit/>
-          </a:bodyPr>
-          <a:lstStyle/>
-          <a:p>
-            <a:r>
-              <a:rPr lang="en-US" sz="1200" b="1" u="sng" dirty="0" smtClean="0">
-                <a:latin typeface="Times New Roman"/>
-                <a:cs typeface="Times New Roman"/>
-              </a:rPr>
-              <a:t>Normalized Message Count Curves (left y-axis)</a:t>
-            </a:r>
-            <a:endParaRPr lang="en-US" sz="1200" b="1" u="sng" dirty="0">
-              <a:latin typeface="Times New Roman"/>
-              <a:cs typeface="Times New Roman"/>
-            </a:endParaRPr>
-          </a:p>
-        </p:txBody>
-      </p:sp>
-      <p:sp>
-        <p:nvSpPr>
-          <p:cNvPr id="16" name="TextBox 15"/>
-          <p:cNvSpPr txBox="1"/>
-          <p:nvPr/>
-        </p:nvSpPr>
-        <p:spPr>
-          <a:xfrm>
-            <a:off x="5725483" y="2780454"/>
             <a:ext cx="4145823" cy="276999"/>
           </a:xfrm>
           <a:prstGeom prst="rect">
@@ -9694,6 +9805,63 @@
           </a:prstGeom>
         </p:spPr>
       </p:pic>
+      <p:sp>
+        <p:nvSpPr>
+          <p:cNvPr id="13" name="TextBox 12"/>
+          <p:cNvSpPr txBox="1"/>
+          <p:nvPr/>
+        </p:nvSpPr>
+        <p:spPr>
+          <a:xfrm>
+            <a:off x="5955712" y="2812740"/>
+            <a:ext cx="4145823" cy="276999"/>
+          </a:xfrm>
+          <a:prstGeom prst="rect">
+            <a:avLst/>
+          </a:prstGeom>
+          <a:noFill/>
+        </p:spPr>
+        <p:txBody>
+          <a:bodyPr wrap="square" rtlCol="0">
+            <a:spAutoFit/>
+          </a:bodyPr>
+          <a:lstStyle/>
+          <a:p>
+            <a:r>
+              <a:rPr lang="en-US" sz="1200" b="1" u="sng" dirty="0" smtClean="0">
+                <a:latin typeface="Times New Roman"/>
+                <a:cs typeface="Times New Roman"/>
+              </a:rPr>
+              <a:t>Curves Showing # of Elements (</a:t>
+            </a:r>
+            <a:r>
+              <a:rPr lang="en-US" sz="1200" b="1" u="sng" dirty="0" smtClean="0">
+                <a:latin typeface="Times New Roman"/>
+                <a:cs typeface="Times New Roman"/>
+              </a:rPr>
+              <a:t>righ</a:t>
+            </a:r>
+            <a:r>
+              <a:rPr lang="en-US" sz="1200" b="1" u="sng" dirty="0" smtClean="0">
+                <a:latin typeface="Times New Roman"/>
+                <a:cs typeface="Times New Roman"/>
+              </a:rPr>
+              <a:t>t </a:t>
+            </a:r>
+            <a:r>
+              <a:rPr lang="en-US" sz="1200" b="1" u="sng" dirty="0" smtClean="0">
+                <a:latin typeface="Times New Roman"/>
+                <a:cs typeface="Times New Roman"/>
+              </a:rPr>
+              <a:t>y-axis)</a:t>
+            </a:r>
+            <a:endParaRPr lang="en-US" sz="1200" b="1" u="sng" dirty="0">
+              <a:latin typeface="Times New Roman"/>
+              <a:cs typeface="Times New Roman"/>
+            </a:endParaRPr>
+          </a:p>
+        </p:txBody>
+      </p:sp>
     </p:spTree>
     <p:extLst>
       <p:ext uri="{BB962C8B-B14F-4D97-AF65-F5344CB8AC3E}">
@@ -9769,42 +9937,6 @@
         <p:spPr>
           <a:xfrm>
             <a:off x="5725483" y="1633776"/>
-            <a:ext cx="4145823" cy="276999"/>
-          </a:xfrm>
-          <a:prstGeom prst="rect">
-            <a:avLst/>
-          </a:prstGeom>
-          <a:noFill/>
-        </p:spPr>
-        <p:txBody>
-          <a:bodyPr wrap="square" rtlCol="0">
-            <a:spAutoFit/>
-          </a:bodyPr>
-          <a:lstStyle/>
-          <a:p>
-            <a:r>
-              <a:rPr lang="en-US" sz="1200" b="1" u="sng" dirty="0" smtClean="0">
-                <a:latin typeface="Times New Roman"/>
-                <a:cs typeface="Times New Roman"/>
-              </a:rPr>
-              <a:t>Normalized Message Count Curves (left y-axis)</a:t>
-            </a:r>
-            <a:endParaRPr lang="en-US" sz="1200" b="1" u="sng" dirty="0">
-              <a:latin typeface="Times New Roman"/>
-              <a:cs typeface="Times New Roman"/>
-            </a:endParaRPr>
-          </a:p>
-        </p:txBody>
-      </p:sp>
-      <p:sp>
-        <p:nvSpPr>
-          <p:cNvPr id="16" name="TextBox 15"/>
-          <p:cNvSpPr txBox="1"/>
-          <p:nvPr/>
-        </p:nvSpPr>
-        <p:spPr>
-          <a:xfrm>
-            <a:off x="5725483" y="2299108"/>
             <a:ext cx="4145823" cy="276999"/>
           </a:xfrm>
           <a:prstGeom prst="rect">
@@ -9934,6 +10066,63 @@
           </a:prstGeom>
         </p:spPr>
       </p:pic>
+      <p:sp>
+        <p:nvSpPr>
+          <p:cNvPr id="10" name="TextBox 9"/>
+          <p:cNvSpPr txBox="1"/>
+          <p:nvPr/>
+        </p:nvSpPr>
+        <p:spPr>
+          <a:xfrm>
+            <a:off x="5896436" y="2308776"/>
+            <a:ext cx="4145823" cy="276999"/>
+          </a:xfrm>
+          <a:prstGeom prst="rect">
+            <a:avLst/>
+          </a:prstGeom>
+          <a:noFill/>
+        </p:spPr>
+        <p:txBody>
+          <a:bodyPr wrap="square" rtlCol="0">
+            <a:spAutoFit/>
+          </a:bodyPr>
+          <a:lstStyle/>
+          <a:p>
+            <a:r>
+              <a:rPr lang="en-US" sz="1200" b="1" u="sng" dirty="0" smtClean="0">
+                <a:latin typeface="Times New Roman"/>
+                <a:cs typeface="Times New Roman"/>
+              </a:rPr>
+              <a:t>Curves Showing # of Elements (</a:t>
+            </a:r>
+            <a:r>
+              <a:rPr lang="en-US" sz="1200" b="1" u="sng" dirty="0" smtClean="0">
+                <a:latin typeface="Times New Roman"/>
+                <a:cs typeface="Times New Roman"/>
+              </a:rPr>
+              <a:t>righ</a:t>
+            </a:r>
+            <a:r>
+              <a:rPr lang="en-US" sz="1200" b="1" u="sng" dirty="0" smtClean="0">
+                <a:latin typeface="Times New Roman"/>
+                <a:cs typeface="Times New Roman"/>
+              </a:rPr>
+              <a:t>t </a:t>
+            </a:r>
+            <a:r>
+              <a:rPr lang="en-US" sz="1200" b="1" u="sng" dirty="0" smtClean="0">
+                <a:latin typeface="Times New Roman"/>
+                <a:cs typeface="Times New Roman"/>
+              </a:rPr>
+              <a:t>y-axis)</a:t>
+            </a:r>
+            <a:endParaRPr lang="en-US" sz="1200" b="1" u="sng" dirty="0">
+              <a:latin typeface="Times New Roman"/>
+              <a:cs typeface="Times New Roman"/>
+            </a:endParaRPr>
+          </a:p>
+        </p:txBody>
+      </p:sp>
     </p:spTree>
     <p:extLst>
       <p:ext uri="{BB962C8B-B14F-4D97-AF65-F5344CB8AC3E}">
@@ -10063,7 +10252,28 @@
                 <a:latin typeface="Times New Roman"/>
                 <a:cs typeface="Times New Roman"/>
               </a:rPr>
-              <a:t>Normalized Message Count Curves (left y-axis)</a:t>
+              <a:t>Curves Showing # of Elements (</a:t>
+            </a:r>
+            <a:r>
+              <a:rPr lang="en-US" sz="1200" b="1" u="sng" dirty="0" smtClean="0">
+                <a:latin typeface="Times New Roman"/>
+                <a:cs typeface="Times New Roman"/>
+              </a:rPr>
+              <a:t>righ</a:t>
+            </a:r>
+            <a:r>
+              <a:rPr lang="en-US" sz="1200" b="1" u="sng" dirty="0" smtClean="0">
+                <a:latin typeface="Times New Roman"/>
+                <a:cs typeface="Times New Roman"/>
+              </a:rPr>
+              <a:t>t </a:t>
+            </a:r>
+            <a:r>
+              <a:rPr lang="en-US" sz="1200" b="1" u="sng" dirty="0" smtClean="0">
+                <a:latin typeface="Times New Roman"/>
+                <a:cs typeface="Times New Roman"/>
+              </a:rPr>
+              <a:t>y-axis)</a:t>
             </a:r>
             <a:endParaRPr lang="en-US" sz="1200" b="1" u="sng" dirty="0">
               <a:latin typeface="Times New Roman"/>

</xml_diff>